<commit_message>
module-7 assignment - launch requirement slide addition
</commit_message>
<xml_diff>
--- a/module-07/Kellam_380Mod07_2.pptx
+++ b/module-07/Kellam_380Mod07_2.pptx
@@ -8,11 +8,12 @@
     <p:sldId id="256" r:id="rId2"/>
     <p:sldId id="258" r:id="rId3"/>
     <p:sldId id="259" r:id="rId4"/>
-    <p:sldId id="260" r:id="rId5"/>
-    <p:sldId id="264" r:id="rId6"/>
-    <p:sldId id="265" r:id="rId7"/>
-    <p:sldId id="263" r:id="rId8"/>
-    <p:sldId id="257" r:id="rId9"/>
+    <p:sldId id="266" r:id="rId5"/>
+    <p:sldId id="260" r:id="rId6"/>
+    <p:sldId id="264" r:id="rId7"/>
+    <p:sldId id="265" r:id="rId8"/>
+    <p:sldId id="263" r:id="rId9"/>
+    <p:sldId id="257" r:id="rId10"/>
   </p:sldIdLst>
   <p:sldSz cx="12192000" cy="6858000"/>
   <p:notesSz cx="6858000" cy="9144000"/>
@@ -122,7 +123,7 @@
 <file path=ppt/revisionInfo.xml><?xml version="1.0" encoding="utf-8"?>
 <p1510:revInfo xmlns:a="http://schemas.openxmlformats.org/drawingml/2006/main" xmlns:r="http://schemas.openxmlformats.org/officeDocument/2006/relationships" xmlns:p1510="http://schemas.microsoft.com/office/powerpoint/2015/10/main">
   <p1510:revLst>
-    <p1510:client id="{C54EB9BB-E15C-4E92-B569-6D0D9E9FF3DD}" v="8" dt="2024-07-22T23:49:16.460"/>
+    <p1510:client id="{C54EB9BB-E15C-4E92-B569-6D0D9E9FF3DD}" v="9" dt="2024-07-23T00:06:05.003"/>
   </p1510:revLst>
 </p1510:revInfo>
 </file>
@@ -132,7 +133,7 @@
   <pc:docChgLst>
     <pc:chgData name="Kellam, Jeremiah {PEP}" userId="da9be42e-c097-46ac-b51e-00185e805c05" providerId="ADAL" clId="{C54EB9BB-E15C-4E92-B569-6D0D9E9FF3DD}"/>
     <pc:docChg chg="undo custSel addSld delSld modSld">
-      <pc:chgData name="Kellam, Jeremiah {PEP}" userId="da9be42e-c097-46ac-b51e-00185e805c05" providerId="ADAL" clId="{C54EB9BB-E15C-4E92-B569-6D0D9E9FF3DD}" dt="2024-07-23T00:02:08.590" v="5320" actId="20577"/>
+      <pc:chgData name="Kellam, Jeremiah {PEP}" userId="da9be42e-c097-46ac-b51e-00185e805c05" providerId="ADAL" clId="{C54EB9BB-E15C-4E92-B569-6D0D9E9FF3DD}" dt="2024-07-23T00:11:35.644" v="5953" actId="14100"/>
       <pc:docMkLst>
         <pc:docMk/>
       </pc:docMkLst>
@@ -339,6 +340,29 @@
             <pc:docMk/>
             <pc:sldMk cId="3465411039" sldId="265"/>
             <ac:spMk id="3" creationId="{B02BF6D4-5B49-A4DE-BE34-BB06B79AE585}"/>
+          </ac:spMkLst>
+        </pc:spChg>
+      </pc:sldChg>
+      <pc:sldChg chg="modSp add mod">
+        <pc:chgData name="Kellam, Jeremiah {PEP}" userId="da9be42e-c097-46ac-b51e-00185e805c05" providerId="ADAL" clId="{C54EB9BB-E15C-4E92-B569-6D0D9E9FF3DD}" dt="2024-07-23T00:11:35.644" v="5953" actId="14100"/>
+        <pc:sldMkLst>
+          <pc:docMk/>
+          <pc:sldMk cId="2370549098" sldId="266"/>
+        </pc:sldMkLst>
+        <pc:spChg chg="mod">
+          <ac:chgData name="Kellam, Jeremiah {PEP}" userId="da9be42e-c097-46ac-b51e-00185e805c05" providerId="ADAL" clId="{C54EB9BB-E15C-4E92-B569-6D0D9E9FF3DD}" dt="2024-07-23T00:07:18.586" v="5387" actId="20577"/>
+          <ac:spMkLst>
+            <pc:docMk/>
+            <pc:sldMk cId="2370549098" sldId="266"/>
+            <ac:spMk id="2" creationId="{21E42387-FABA-98F6-5520-8997D0B3C826}"/>
+          </ac:spMkLst>
+        </pc:spChg>
+        <pc:spChg chg="mod">
+          <ac:chgData name="Kellam, Jeremiah {PEP}" userId="da9be42e-c097-46ac-b51e-00185e805c05" providerId="ADAL" clId="{C54EB9BB-E15C-4E92-B569-6D0D9E9FF3DD}" dt="2024-07-23T00:11:35.644" v="5953" actId="14100"/>
+          <ac:spMkLst>
+            <pc:docMk/>
+            <pc:sldMk cId="2370549098" sldId="266"/>
+            <ac:spMk id="3" creationId="{12AB2E0E-D673-A940-5EDA-64AFA06060F3}"/>
           </ac:spMkLst>
         </pc:spChg>
       </pc:sldChg>
@@ -613,7 +637,7 @@
           <a:noFill/>
           <a:extLst>
             <a:ext uri="{909E8E84-426E-40dd-AFC4-6F175D3DCCD1}">
-              <a14:hiddenFill xmlns="" xmlns:a14="http://schemas.microsoft.com/office/drawing/2010/main">
+              <a14:hiddenFill xmlns:a14="http://schemas.microsoft.com/office/drawing/2010/main" xmlns="">
                 <a:solidFill>
                   <a:srgbClr val="FFFFFF"/>
                 </a:solidFill>
@@ -672,7 +696,7 @@
             </a:ln>
             <a:extLst>
               <a:ext uri="{91240B29-F687-4f45-9708-019B960494DF}">
-                <a14:hiddenLine xmlns="" xmlns:a14="http://schemas.microsoft.com/office/drawing/2010/main" w="9525">
+                <a14:hiddenLine xmlns:a14="http://schemas.microsoft.com/office/drawing/2010/main" xmlns="" w="9525">
                   <a:solidFill>
                     <a:srgbClr val="000000"/>
                   </a:solidFill>
@@ -762,7 +786,7 @@
             </a:ln>
             <a:extLst>
               <a:ext uri="{91240B29-F687-4f45-9708-019B960494DF}">
-                <a14:hiddenLine xmlns="" xmlns:a14="http://schemas.microsoft.com/office/drawing/2010/main" w="9525">
+                <a14:hiddenLine xmlns:a14="http://schemas.microsoft.com/office/drawing/2010/main" xmlns="" w="9525">
                   <a:solidFill>
                     <a:srgbClr val="000000"/>
                   </a:solidFill>
@@ -852,7 +876,7 @@
             </a:ln>
             <a:extLst>
               <a:ext uri="{91240B29-F687-4f45-9708-019B960494DF}">
-                <a14:hiddenLine xmlns="" xmlns:a14="http://schemas.microsoft.com/office/drawing/2010/main" w="9525">
+                <a14:hiddenLine xmlns:a14="http://schemas.microsoft.com/office/drawing/2010/main" xmlns="" w="9525">
                   <a:solidFill>
                     <a:srgbClr val="000000"/>
                   </a:solidFill>
@@ -886,7 +910,7 @@
             </a:ln>
             <a:extLst>
               <a:ext uri="{91240B29-F687-4f45-9708-019B960494DF}">
-                <a14:hiddenLine xmlns="" xmlns:a14="http://schemas.microsoft.com/office/drawing/2010/main" w="9525">
+                <a14:hiddenLine xmlns:a14="http://schemas.microsoft.com/office/drawing/2010/main" xmlns="" w="9525">
                   <a:solidFill>
                     <a:srgbClr val="000000"/>
                   </a:solidFill>
@@ -976,7 +1000,7 @@
             </a:ln>
             <a:extLst>
               <a:ext uri="{91240B29-F687-4f45-9708-019B960494DF}">
-                <a14:hiddenLine xmlns="" xmlns:a14="http://schemas.microsoft.com/office/drawing/2010/main" w="9525">
+                <a14:hiddenLine xmlns:a14="http://schemas.microsoft.com/office/drawing/2010/main" xmlns="" w="9525">
                   <a:solidFill>
                     <a:srgbClr val="000000"/>
                   </a:solidFill>
@@ -1038,7 +1062,7 @@
             </a:ln>
             <a:extLst>
               <a:ext uri="{91240B29-F687-4f45-9708-019B960494DF}">
-                <a14:hiddenLine xmlns="" xmlns:a14="http://schemas.microsoft.com/office/drawing/2010/main" w="9525">
+                <a14:hiddenLine xmlns:a14="http://schemas.microsoft.com/office/drawing/2010/main" xmlns="" w="9525">
                   <a:solidFill>
                     <a:srgbClr val="000000"/>
                   </a:solidFill>
@@ -1100,7 +1124,7 @@
             </a:ln>
             <a:extLst>
               <a:ext uri="{91240B29-F687-4f45-9708-019B960494DF}">
-                <a14:hiddenLine xmlns="" xmlns:a14="http://schemas.microsoft.com/office/drawing/2010/main" w="9525">
+                <a14:hiddenLine xmlns:a14="http://schemas.microsoft.com/office/drawing/2010/main" xmlns="" w="9525">
                   <a:solidFill>
                     <a:srgbClr val="000000"/>
                   </a:solidFill>
@@ -1190,7 +1214,7 @@
             </a:ln>
             <a:extLst>
               <a:ext uri="{91240B29-F687-4f45-9708-019B960494DF}">
-                <a14:hiddenLine xmlns="" xmlns:a14="http://schemas.microsoft.com/office/drawing/2010/main" w="9525">
+                <a14:hiddenLine xmlns:a14="http://schemas.microsoft.com/office/drawing/2010/main" xmlns="" w="9525">
                   <a:solidFill>
                     <a:srgbClr val="000000"/>
                   </a:solidFill>
@@ -1252,7 +1276,7 @@
             </a:ln>
             <a:extLst>
               <a:ext uri="{91240B29-F687-4f45-9708-019B960494DF}">
-                <a14:hiddenLine xmlns="" xmlns:a14="http://schemas.microsoft.com/office/drawing/2010/main" w="9525">
+                <a14:hiddenLine xmlns:a14="http://schemas.microsoft.com/office/drawing/2010/main" xmlns="" w="9525">
                   <a:solidFill>
                     <a:srgbClr val="000000"/>
                   </a:solidFill>
@@ -1314,7 +1338,7 @@
             </a:ln>
             <a:extLst>
               <a:ext uri="{91240B29-F687-4f45-9708-019B960494DF}">
-                <a14:hiddenLine xmlns="" xmlns:a14="http://schemas.microsoft.com/office/drawing/2010/main" w="9525">
+                <a14:hiddenLine xmlns:a14="http://schemas.microsoft.com/office/drawing/2010/main" xmlns="" w="9525">
                   <a:solidFill>
                     <a:srgbClr val="000000"/>
                   </a:solidFill>
@@ -1404,7 +1428,7 @@
             </a:ln>
             <a:extLst>
               <a:ext uri="{91240B29-F687-4f45-9708-019B960494DF}">
-                <a14:hiddenLine xmlns="" xmlns:a14="http://schemas.microsoft.com/office/drawing/2010/main" w="9525">
+                <a14:hiddenLine xmlns:a14="http://schemas.microsoft.com/office/drawing/2010/main" xmlns="" w="9525">
                   <a:solidFill>
                     <a:srgbClr val="000000"/>
                   </a:solidFill>
@@ -1494,7 +1518,7 @@
             </a:ln>
             <a:extLst>
               <a:ext uri="{91240B29-F687-4f45-9708-019B960494DF}">
-                <a14:hiddenLine xmlns="" xmlns:a14="http://schemas.microsoft.com/office/drawing/2010/main" w="9525">
+                <a14:hiddenLine xmlns:a14="http://schemas.microsoft.com/office/drawing/2010/main" xmlns="" w="9525">
                   <a:solidFill>
                     <a:srgbClr val="000000"/>
                   </a:solidFill>
@@ -1556,7 +1580,7 @@
             </a:ln>
             <a:extLst>
               <a:ext uri="{91240B29-F687-4f45-9708-019B960494DF}">
-                <a14:hiddenLine xmlns="" xmlns:a14="http://schemas.microsoft.com/office/drawing/2010/main" w="9525">
+                <a14:hiddenLine xmlns:a14="http://schemas.microsoft.com/office/drawing/2010/main" xmlns="" w="9525">
                   <a:solidFill>
                     <a:srgbClr val="000000"/>
                   </a:solidFill>
@@ -1666,7 +1690,7 @@
             </a:ln>
             <a:extLst>
               <a:ext uri="{91240B29-F687-4f45-9708-019B960494DF}">
-                <a14:hiddenLine xmlns="" xmlns:a14="http://schemas.microsoft.com/office/drawing/2010/main" w="9525">
+                <a14:hiddenLine xmlns:a14="http://schemas.microsoft.com/office/drawing/2010/main" xmlns="" w="9525">
                   <a:solidFill>
                     <a:srgbClr val="000000"/>
                   </a:solidFill>
@@ -1728,7 +1752,7 @@
             </a:ln>
             <a:extLst>
               <a:ext uri="{91240B29-F687-4f45-9708-019B960494DF}">
-                <a14:hiddenLine xmlns="" xmlns:a14="http://schemas.microsoft.com/office/drawing/2010/main" w="9525">
+                <a14:hiddenLine xmlns:a14="http://schemas.microsoft.com/office/drawing/2010/main" xmlns="" w="9525">
                   <a:solidFill>
                     <a:srgbClr val="000000"/>
                   </a:solidFill>
@@ -1818,7 +1842,7 @@
             </a:ln>
             <a:extLst>
               <a:ext uri="{91240B29-F687-4f45-9708-019B960494DF}">
-                <a14:hiddenLine xmlns="" xmlns:a14="http://schemas.microsoft.com/office/drawing/2010/main" w="9525">
+                <a14:hiddenLine xmlns:a14="http://schemas.microsoft.com/office/drawing/2010/main" xmlns="" w="9525">
                   <a:solidFill>
                     <a:srgbClr val="000000"/>
                   </a:solidFill>
@@ -1908,7 +1932,7 @@
             </a:ln>
             <a:extLst>
               <a:ext uri="{91240B29-F687-4f45-9708-019B960494DF}">
-                <a14:hiddenLine xmlns="" xmlns:a14="http://schemas.microsoft.com/office/drawing/2010/main" w="9525">
+                <a14:hiddenLine xmlns:a14="http://schemas.microsoft.com/office/drawing/2010/main" xmlns="" w="9525">
                   <a:solidFill>
                     <a:srgbClr val="000000"/>
                   </a:solidFill>
@@ -1970,7 +1994,7 @@
             </a:ln>
             <a:extLst>
               <a:ext uri="{91240B29-F687-4f45-9708-019B960494DF}">
-                <a14:hiddenLine xmlns="" xmlns:a14="http://schemas.microsoft.com/office/drawing/2010/main" w="9525">
+                <a14:hiddenLine xmlns:a14="http://schemas.microsoft.com/office/drawing/2010/main" xmlns="" w="9525">
                   <a:solidFill>
                     <a:srgbClr val="000000"/>
                   </a:solidFill>
@@ -2060,7 +2084,7 @@
             </a:ln>
             <a:extLst>
               <a:ext uri="{91240B29-F687-4f45-9708-019B960494DF}">
-                <a14:hiddenLine xmlns="" xmlns:a14="http://schemas.microsoft.com/office/drawing/2010/main" w="9525">
+                <a14:hiddenLine xmlns:a14="http://schemas.microsoft.com/office/drawing/2010/main" xmlns="" w="9525">
                   <a:solidFill>
                     <a:srgbClr val="000000"/>
                   </a:solidFill>
@@ -2150,7 +2174,7 @@
             </a:ln>
             <a:extLst>
               <a:ext uri="{91240B29-F687-4f45-9708-019B960494DF}">
-                <a14:hiddenLine xmlns="" xmlns:a14="http://schemas.microsoft.com/office/drawing/2010/main" w="9525">
+                <a14:hiddenLine xmlns:a14="http://schemas.microsoft.com/office/drawing/2010/main" xmlns="" w="9525">
                   <a:solidFill>
                     <a:srgbClr val="000000"/>
                   </a:solidFill>
@@ -2206,7 +2230,7 @@
             </a:ln>
             <a:extLst>
               <a:ext uri="{91240B29-F687-4f45-9708-019B960494DF}">
-                <a14:hiddenLine xmlns="" xmlns:a14="http://schemas.microsoft.com/office/drawing/2010/main" w="9525">
+                <a14:hiddenLine xmlns:a14="http://schemas.microsoft.com/office/drawing/2010/main" xmlns="" w="9525">
                   <a:solidFill>
                     <a:srgbClr val="000000"/>
                   </a:solidFill>
@@ -2296,7 +2320,7 @@
             </a:ln>
             <a:extLst>
               <a:ext uri="{91240B29-F687-4f45-9708-019B960494DF}">
-                <a14:hiddenLine xmlns="" xmlns:a14="http://schemas.microsoft.com/office/drawing/2010/main" w="9525">
+                <a14:hiddenLine xmlns:a14="http://schemas.microsoft.com/office/drawing/2010/main" xmlns="" w="9525">
                   <a:solidFill>
                     <a:srgbClr val="000000"/>
                   </a:solidFill>
@@ -2352,7 +2376,7 @@
             </a:ln>
             <a:extLst>
               <a:ext uri="{91240B29-F687-4f45-9708-019B960494DF}">
-                <a14:hiddenLine xmlns="" xmlns:a14="http://schemas.microsoft.com/office/drawing/2010/main" w="9525">
+                <a14:hiddenLine xmlns:a14="http://schemas.microsoft.com/office/drawing/2010/main" xmlns="" w="9525">
                   <a:solidFill>
                     <a:srgbClr val="000000"/>
                   </a:solidFill>
@@ -2442,7 +2466,7 @@
             </a:ln>
             <a:extLst>
               <a:ext uri="{91240B29-F687-4f45-9708-019B960494DF}">
-                <a14:hiddenLine xmlns="" xmlns:a14="http://schemas.microsoft.com/office/drawing/2010/main" w="9525">
+                <a14:hiddenLine xmlns:a14="http://schemas.microsoft.com/office/drawing/2010/main" xmlns="" w="9525">
                   <a:solidFill>
                     <a:srgbClr val="000000"/>
                   </a:solidFill>
@@ -2510,7 +2534,7 @@
             </a:ln>
             <a:extLst>
               <a:ext uri="{91240B29-F687-4f45-9708-019B960494DF}">
-                <a14:hiddenLine xmlns="" xmlns:a14="http://schemas.microsoft.com/office/drawing/2010/main" w="9525">
+                <a14:hiddenLine xmlns:a14="http://schemas.microsoft.com/office/drawing/2010/main" xmlns="" w="9525">
                   <a:solidFill>
                     <a:srgbClr val="000000"/>
                   </a:solidFill>
@@ -2600,7 +2624,7 @@
             </a:ln>
             <a:extLst>
               <a:ext uri="{91240B29-F687-4f45-9708-019B960494DF}">
-                <a14:hiddenLine xmlns="" xmlns:a14="http://schemas.microsoft.com/office/drawing/2010/main" w="9525">
+                <a14:hiddenLine xmlns:a14="http://schemas.microsoft.com/office/drawing/2010/main" xmlns="" w="9525">
                   <a:solidFill>
                     <a:srgbClr val="000000"/>
                   </a:solidFill>
@@ -2668,7 +2692,7 @@
             </a:ln>
             <a:extLst>
               <a:ext uri="{91240B29-F687-4f45-9708-019B960494DF}">
-                <a14:hiddenLine xmlns="" xmlns:a14="http://schemas.microsoft.com/office/drawing/2010/main" w="9525">
+                <a14:hiddenLine xmlns:a14="http://schemas.microsoft.com/office/drawing/2010/main" xmlns="" w="9525">
                   <a:solidFill>
                     <a:srgbClr val="000000"/>
                   </a:solidFill>
@@ -2758,7 +2782,7 @@
             </a:ln>
             <a:extLst>
               <a:ext uri="{91240B29-F687-4f45-9708-019B960494DF}">
-                <a14:hiddenLine xmlns="" xmlns:a14="http://schemas.microsoft.com/office/drawing/2010/main" w="9525">
+                <a14:hiddenLine xmlns:a14="http://schemas.microsoft.com/office/drawing/2010/main" xmlns="" w="9525">
                   <a:solidFill>
                     <a:srgbClr val="000000"/>
                   </a:solidFill>
@@ -2792,7 +2816,7 @@
             </a:ln>
             <a:extLst>
               <a:ext uri="{91240B29-F687-4f45-9708-019B960494DF}">
-                <a14:hiddenLine xmlns="" xmlns:a14="http://schemas.microsoft.com/office/drawing/2010/main" w="9525">
+                <a14:hiddenLine xmlns:a14="http://schemas.microsoft.com/office/drawing/2010/main" xmlns="" w="9525">
                   <a:solidFill>
                     <a:srgbClr val="000000"/>
                   </a:solidFill>
@@ -2882,7 +2906,7 @@
             </a:ln>
             <a:extLst>
               <a:ext uri="{91240B29-F687-4f45-9708-019B960494DF}">
-                <a14:hiddenLine xmlns="" xmlns:a14="http://schemas.microsoft.com/office/drawing/2010/main" w="9525">
+                <a14:hiddenLine xmlns:a14="http://schemas.microsoft.com/office/drawing/2010/main" xmlns="" w="9525">
                   <a:solidFill>
                     <a:srgbClr val="000000"/>
                   </a:solidFill>
@@ -2944,7 +2968,7 @@
             </a:ln>
             <a:extLst>
               <a:ext uri="{91240B29-F687-4f45-9708-019B960494DF}">
-                <a14:hiddenLine xmlns="" xmlns:a14="http://schemas.microsoft.com/office/drawing/2010/main" w="9525">
+                <a14:hiddenLine xmlns:a14="http://schemas.microsoft.com/office/drawing/2010/main" xmlns="" w="9525">
                   <a:solidFill>
                     <a:srgbClr val="000000"/>
                   </a:solidFill>
@@ -3006,7 +3030,7 @@
             </a:ln>
             <a:extLst>
               <a:ext uri="{91240B29-F687-4f45-9708-019B960494DF}">
-                <a14:hiddenLine xmlns="" xmlns:a14="http://schemas.microsoft.com/office/drawing/2010/main" w="9525">
+                <a14:hiddenLine xmlns:a14="http://schemas.microsoft.com/office/drawing/2010/main" xmlns="" w="9525">
                   <a:solidFill>
                     <a:srgbClr val="000000"/>
                   </a:solidFill>
@@ -3096,7 +3120,7 @@
             </a:ln>
             <a:extLst>
               <a:ext uri="{91240B29-F687-4f45-9708-019B960494DF}">
-                <a14:hiddenLine xmlns="" xmlns:a14="http://schemas.microsoft.com/office/drawing/2010/main" w="9525">
+                <a14:hiddenLine xmlns:a14="http://schemas.microsoft.com/office/drawing/2010/main" xmlns="" w="9525">
                   <a:solidFill>
                     <a:srgbClr val="000000"/>
                   </a:solidFill>
@@ -3164,7 +3188,7 @@
             </a:ln>
             <a:extLst>
               <a:ext uri="{91240B29-F687-4f45-9708-019B960494DF}">
-                <a14:hiddenLine xmlns="" xmlns:a14="http://schemas.microsoft.com/office/drawing/2010/main" w="9525">
+                <a14:hiddenLine xmlns:a14="http://schemas.microsoft.com/office/drawing/2010/main" xmlns="" w="9525">
                   <a:solidFill>
                     <a:srgbClr val="000000"/>
                   </a:solidFill>
@@ -3226,7 +3250,7 @@
             </a:ln>
             <a:extLst>
               <a:ext uri="{91240B29-F687-4f45-9708-019B960494DF}">
-                <a14:hiddenLine xmlns="" xmlns:a14="http://schemas.microsoft.com/office/drawing/2010/main" w="9525">
+                <a14:hiddenLine xmlns:a14="http://schemas.microsoft.com/office/drawing/2010/main" xmlns="" w="9525">
                   <a:solidFill>
                     <a:srgbClr val="000000"/>
                   </a:solidFill>
@@ -3316,7 +3340,7 @@
             </a:ln>
             <a:extLst>
               <a:ext uri="{91240B29-F687-4f45-9708-019B960494DF}">
-                <a14:hiddenLine xmlns="" xmlns:a14="http://schemas.microsoft.com/office/drawing/2010/main" w="9525">
+                <a14:hiddenLine xmlns:a14="http://schemas.microsoft.com/office/drawing/2010/main" xmlns="" w="9525">
                   <a:solidFill>
                     <a:srgbClr val="000000"/>
                   </a:solidFill>
@@ -3378,7 +3402,7 @@
             </a:ln>
             <a:extLst>
               <a:ext uri="{91240B29-F687-4f45-9708-019B960494DF}">
-                <a14:hiddenLine xmlns="" xmlns:a14="http://schemas.microsoft.com/office/drawing/2010/main" w="9525">
+                <a14:hiddenLine xmlns:a14="http://schemas.microsoft.com/office/drawing/2010/main" xmlns="" w="9525">
                   <a:solidFill>
                     <a:srgbClr val="000000"/>
                   </a:solidFill>
@@ -3468,7 +3492,7 @@
             </a:ln>
             <a:extLst>
               <a:ext uri="{91240B29-F687-4f45-9708-019B960494DF}">
-                <a14:hiddenLine xmlns="" xmlns:a14="http://schemas.microsoft.com/office/drawing/2010/main" w="9525">
+                <a14:hiddenLine xmlns:a14="http://schemas.microsoft.com/office/drawing/2010/main" xmlns="" w="9525">
                   <a:solidFill>
                     <a:srgbClr val="000000"/>
                   </a:solidFill>
@@ -3530,7 +3554,7 @@
             </a:ln>
             <a:extLst>
               <a:ext uri="{91240B29-F687-4f45-9708-019B960494DF}">
-                <a14:hiddenLine xmlns="" xmlns:a14="http://schemas.microsoft.com/office/drawing/2010/main" w="9525">
+                <a14:hiddenLine xmlns:a14="http://schemas.microsoft.com/office/drawing/2010/main" xmlns="" w="9525">
                   <a:solidFill>
                     <a:srgbClr val="000000"/>
                   </a:solidFill>
@@ -3620,7 +3644,7 @@
             </a:ln>
             <a:extLst>
               <a:ext uri="{91240B29-F687-4f45-9708-019B960494DF}">
-                <a14:hiddenLine xmlns="" xmlns:a14="http://schemas.microsoft.com/office/drawing/2010/main" w="9525">
+                <a14:hiddenLine xmlns:a14="http://schemas.microsoft.com/office/drawing/2010/main" xmlns="" w="9525">
                   <a:solidFill>
                     <a:srgbClr val="000000"/>
                   </a:solidFill>
@@ -3654,7 +3678,7 @@
             </a:ln>
             <a:extLst>
               <a:ext uri="{91240B29-F687-4f45-9708-019B960494DF}">
-                <a14:hiddenLine xmlns="" xmlns:a14="http://schemas.microsoft.com/office/drawing/2010/main" w="9525">
+                <a14:hiddenLine xmlns:a14="http://schemas.microsoft.com/office/drawing/2010/main" xmlns="" w="9525">
                   <a:solidFill>
                     <a:srgbClr val="000000"/>
                   </a:solidFill>
@@ -3719,7 +3743,7 @@
             </a:ln>
             <a:extLst>
               <a:ext uri="{91240B29-F687-4f45-9708-019B960494DF}">
-                <a14:hiddenLine xmlns="" xmlns:a14="http://schemas.microsoft.com/office/drawing/2010/main" w="9525">
+                <a14:hiddenLine xmlns:a14="http://schemas.microsoft.com/office/drawing/2010/main" xmlns="" w="9525">
                   <a:solidFill>
                     <a:srgbClr val="000000"/>
                   </a:solidFill>
@@ -3809,7 +3833,7 @@
             </a:ln>
             <a:extLst>
               <a:ext uri="{91240B29-F687-4f45-9708-019B960494DF}">
-                <a14:hiddenLine xmlns="" xmlns:a14="http://schemas.microsoft.com/office/drawing/2010/main" w="9525">
+                <a14:hiddenLine xmlns:a14="http://schemas.microsoft.com/office/drawing/2010/main" xmlns="" w="9525">
                   <a:solidFill>
                     <a:srgbClr val="000000"/>
                   </a:solidFill>
@@ -3871,7 +3895,7 @@
             </a:ln>
             <a:extLst>
               <a:ext uri="{91240B29-F687-4f45-9708-019B960494DF}">
-                <a14:hiddenLine xmlns="" xmlns:a14="http://schemas.microsoft.com/office/drawing/2010/main" w="9525">
+                <a14:hiddenLine xmlns:a14="http://schemas.microsoft.com/office/drawing/2010/main" xmlns="" w="9525">
                   <a:solidFill>
                     <a:srgbClr val="000000"/>
                   </a:solidFill>
@@ -3961,7 +3985,7 @@
             </a:ln>
             <a:extLst>
               <a:ext uri="{91240B29-F687-4f45-9708-019B960494DF}">
-                <a14:hiddenLine xmlns="" xmlns:a14="http://schemas.microsoft.com/office/drawing/2010/main" w="9525">
+                <a14:hiddenLine xmlns:a14="http://schemas.microsoft.com/office/drawing/2010/main" xmlns="" w="9525">
                   <a:solidFill>
                     <a:srgbClr val="000000"/>
                   </a:solidFill>
@@ -4051,7 +4075,7 @@
             </a:ln>
             <a:extLst>
               <a:ext uri="{91240B29-F687-4f45-9708-019B960494DF}">
-                <a14:hiddenLine xmlns="" xmlns:a14="http://schemas.microsoft.com/office/drawing/2010/main" w="9525">
+                <a14:hiddenLine xmlns:a14="http://schemas.microsoft.com/office/drawing/2010/main" xmlns="" w="9525">
                   <a:solidFill>
                     <a:srgbClr val="000000"/>
                   </a:solidFill>
@@ -4116,7 +4140,7 @@
             </a:ln>
             <a:extLst>
               <a:ext uri="{91240B29-F687-4f45-9708-019B960494DF}">
-                <a14:hiddenLine xmlns="" xmlns:a14="http://schemas.microsoft.com/office/drawing/2010/main" w="9525">
+                <a14:hiddenLine xmlns:a14="http://schemas.microsoft.com/office/drawing/2010/main" xmlns="" w="9525">
                   <a:solidFill>
                     <a:srgbClr val="000000"/>
                   </a:solidFill>
@@ -4178,7 +4202,7 @@
             </a:ln>
             <a:extLst>
               <a:ext uri="{91240B29-F687-4f45-9708-019B960494DF}">
-                <a14:hiddenLine xmlns="" xmlns:a14="http://schemas.microsoft.com/office/drawing/2010/main" w="9525">
+                <a14:hiddenLine xmlns:a14="http://schemas.microsoft.com/office/drawing/2010/main" xmlns="" w="9525">
                   <a:solidFill>
                     <a:srgbClr val="000000"/>
                   </a:solidFill>
@@ -4268,7 +4292,7 @@
             </a:ln>
             <a:extLst>
               <a:ext uri="{91240B29-F687-4f45-9708-019B960494DF}">
-                <a14:hiddenLine xmlns="" xmlns:a14="http://schemas.microsoft.com/office/drawing/2010/main" w="9525">
+                <a14:hiddenLine xmlns:a14="http://schemas.microsoft.com/office/drawing/2010/main" xmlns="" w="9525">
                   <a:solidFill>
                     <a:srgbClr val="000000"/>
                   </a:solidFill>
@@ -4358,7 +4382,7 @@
             </a:ln>
             <a:extLst>
               <a:ext uri="{91240B29-F687-4f45-9708-019B960494DF}">
-                <a14:hiddenLine xmlns="" xmlns:a14="http://schemas.microsoft.com/office/drawing/2010/main" w="9525">
+                <a14:hiddenLine xmlns:a14="http://schemas.microsoft.com/office/drawing/2010/main" xmlns="" w="9525">
                   <a:solidFill>
                     <a:srgbClr val="000000"/>
                   </a:solidFill>
@@ -4420,7 +4444,7 @@
             </a:ln>
             <a:extLst>
               <a:ext uri="{91240B29-F687-4f45-9708-019B960494DF}">
-                <a14:hiddenLine xmlns="" xmlns:a14="http://schemas.microsoft.com/office/drawing/2010/main" w="9525">
+                <a14:hiddenLine xmlns:a14="http://schemas.microsoft.com/office/drawing/2010/main" xmlns="" w="9525">
                   <a:solidFill>
                     <a:srgbClr val="000000"/>
                   </a:solidFill>
@@ -4540,7 +4564,7 @@
             </a:ln>
             <a:extLst>
               <a:ext uri="{91240B29-F687-4f45-9708-019B960494DF}">
-                <a14:hiddenLine xmlns="" xmlns:a14="http://schemas.microsoft.com/office/drawing/2010/main" w="9525">
+                <a14:hiddenLine xmlns:a14="http://schemas.microsoft.com/office/drawing/2010/main" xmlns="" w="9525">
                   <a:solidFill>
                     <a:srgbClr val="000000"/>
                   </a:solidFill>
@@ -4608,7 +4632,7 @@
             </a:ln>
             <a:extLst>
               <a:ext uri="{91240B29-F687-4f45-9708-019B960494DF}">
-                <a14:hiddenLine xmlns="" xmlns:a14="http://schemas.microsoft.com/office/drawing/2010/main" w="9525">
+                <a14:hiddenLine xmlns:a14="http://schemas.microsoft.com/office/drawing/2010/main" xmlns="" w="9525">
                   <a:solidFill>
                     <a:srgbClr val="000000"/>
                   </a:solidFill>
@@ -4698,7 +4722,7 @@
             </a:ln>
             <a:extLst>
               <a:ext uri="{91240B29-F687-4f45-9708-019B960494DF}">
-                <a14:hiddenLine xmlns="" xmlns:a14="http://schemas.microsoft.com/office/drawing/2010/main" w="9525">
+                <a14:hiddenLine xmlns:a14="http://schemas.microsoft.com/office/drawing/2010/main" xmlns="" w="9525">
                   <a:solidFill>
                     <a:srgbClr val="000000"/>
                   </a:solidFill>
@@ -9427,7 +9451,7 @@
           <a:noFill/>
           <a:extLst>
             <a:ext uri="{909E8E84-426E-40dd-AFC4-6F175D3DCCD1}">
-              <a14:hiddenFill xmlns="" xmlns:a14="http://schemas.microsoft.com/office/drawing/2010/main">
+              <a14:hiddenFill xmlns:a14="http://schemas.microsoft.com/office/drawing/2010/main" xmlns="">
                 <a:solidFill>
                   <a:srgbClr val="FFFFFF"/>
                 </a:solidFill>
@@ -9501,7 +9525,7 @@
               </a:ln>
               <a:extLst>
                 <a:ext uri="{91240B29-F687-4f45-9708-019B960494DF}">
-                  <a14:hiddenLine xmlns="" xmlns:a14="http://schemas.microsoft.com/office/drawing/2010/main" w="9525">
+                  <a14:hiddenLine xmlns:a14="http://schemas.microsoft.com/office/drawing/2010/main" xmlns="" w="9525">
                     <a:solidFill>
                       <a:srgbClr val="000000"/>
                     </a:solidFill>
@@ -9591,7 +9615,7 @@
               </a:ln>
               <a:extLst>
                 <a:ext uri="{91240B29-F687-4f45-9708-019B960494DF}">
-                  <a14:hiddenLine xmlns="" xmlns:a14="http://schemas.microsoft.com/office/drawing/2010/main" w="9525">
+                  <a14:hiddenLine xmlns:a14="http://schemas.microsoft.com/office/drawing/2010/main" xmlns="" w="9525">
                     <a:solidFill>
                       <a:srgbClr val="000000"/>
                     </a:solidFill>
@@ -9681,7 +9705,7 @@
               </a:ln>
               <a:extLst>
                 <a:ext uri="{91240B29-F687-4f45-9708-019B960494DF}">
-                  <a14:hiddenLine xmlns="" xmlns:a14="http://schemas.microsoft.com/office/drawing/2010/main" w="9525">
+                  <a14:hiddenLine xmlns:a14="http://schemas.microsoft.com/office/drawing/2010/main" xmlns="" w="9525">
                     <a:solidFill>
                       <a:srgbClr val="000000"/>
                     </a:solidFill>
@@ -9743,7 +9767,7 @@
               </a:ln>
               <a:extLst>
                 <a:ext uri="{91240B29-F687-4f45-9708-019B960494DF}">
-                  <a14:hiddenLine xmlns="" xmlns:a14="http://schemas.microsoft.com/office/drawing/2010/main" w="9525">
+                  <a14:hiddenLine xmlns:a14="http://schemas.microsoft.com/office/drawing/2010/main" xmlns="" w="9525">
                     <a:solidFill>
                       <a:srgbClr val="000000"/>
                     </a:solidFill>
@@ -9833,7 +9857,7 @@
               </a:ln>
               <a:extLst>
                 <a:ext uri="{91240B29-F687-4f45-9708-019B960494DF}">
-                  <a14:hiddenLine xmlns="" xmlns:a14="http://schemas.microsoft.com/office/drawing/2010/main" w="9525">
+                  <a14:hiddenLine xmlns:a14="http://schemas.microsoft.com/office/drawing/2010/main" xmlns="" w="9525">
                     <a:solidFill>
                       <a:srgbClr val="000000"/>
                     </a:solidFill>
@@ -9895,7 +9919,7 @@
               </a:ln>
               <a:extLst>
                 <a:ext uri="{91240B29-F687-4f45-9708-019B960494DF}">
-                  <a14:hiddenLine xmlns="" xmlns:a14="http://schemas.microsoft.com/office/drawing/2010/main" w="9525">
+                  <a14:hiddenLine xmlns:a14="http://schemas.microsoft.com/office/drawing/2010/main" xmlns="" w="9525">
                     <a:solidFill>
                       <a:srgbClr val="000000"/>
                     </a:solidFill>
@@ -9957,7 +9981,7 @@
               </a:ln>
               <a:extLst>
                 <a:ext uri="{91240B29-F687-4f45-9708-019B960494DF}">
-                  <a14:hiddenLine xmlns="" xmlns:a14="http://schemas.microsoft.com/office/drawing/2010/main" w="9525">
+                  <a14:hiddenLine xmlns:a14="http://schemas.microsoft.com/office/drawing/2010/main" xmlns="" w="9525">
                     <a:solidFill>
                       <a:srgbClr val="000000"/>
                     </a:solidFill>
@@ -10047,7 +10071,7 @@
               </a:ln>
               <a:extLst>
                 <a:ext uri="{91240B29-F687-4f45-9708-019B960494DF}">
-                  <a14:hiddenLine xmlns="" xmlns:a14="http://schemas.microsoft.com/office/drawing/2010/main" w="9525">
+                  <a14:hiddenLine xmlns:a14="http://schemas.microsoft.com/office/drawing/2010/main" xmlns="" w="9525">
                     <a:solidFill>
                       <a:srgbClr val="000000"/>
                     </a:solidFill>
@@ -10137,7 +10161,7 @@
               </a:ln>
               <a:extLst>
                 <a:ext uri="{91240B29-F687-4f45-9708-019B960494DF}">
-                  <a14:hiddenLine xmlns="" xmlns:a14="http://schemas.microsoft.com/office/drawing/2010/main" w="9525">
+                  <a14:hiddenLine xmlns:a14="http://schemas.microsoft.com/office/drawing/2010/main" xmlns="" w="9525">
                     <a:solidFill>
                       <a:srgbClr val="000000"/>
                     </a:solidFill>
@@ -10199,7 +10223,7 @@
               </a:ln>
               <a:extLst>
                 <a:ext uri="{91240B29-F687-4f45-9708-019B960494DF}">
-                  <a14:hiddenLine xmlns="" xmlns:a14="http://schemas.microsoft.com/office/drawing/2010/main" w="9525">
+                  <a14:hiddenLine xmlns:a14="http://schemas.microsoft.com/office/drawing/2010/main" xmlns="" w="9525">
                     <a:solidFill>
                       <a:srgbClr val="000000"/>
                     </a:solidFill>
@@ -10309,7 +10333,7 @@
               </a:ln>
               <a:extLst>
                 <a:ext uri="{91240B29-F687-4f45-9708-019B960494DF}">
-                  <a14:hiddenLine xmlns="" xmlns:a14="http://schemas.microsoft.com/office/drawing/2010/main" w="9525">
+                  <a14:hiddenLine xmlns:a14="http://schemas.microsoft.com/office/drawing/2010/main" xmlns="" w="9525">
                     <a:solidFill>
                       <a:srgbClr val="000000"/>
                     </a:solidFill>
@@ -10393,7 +10417,7 @@
               </a:ln>
               <a:extLst>
                 <a:ext uri="{91240B29-F687-4f45-9708-019B960494DF}">
-                  <a14:hiddenLine xmlns="" xmlns:a14="http://schemas.microsoft.com/office/drawing/2010/main" w="9525">
+                  <a14:hiddenLine xmlns:a14="http://schemas.microsoft.com/office/drawing/2010/main" xmlns="" w="9525">
                     <a:solidFill>
                       <a:srgbClr val="000000"/>
                     </a:solidFill>
@@ -10455,7 +10479,7 @@
               </a:ln>
               <a:extLst>
                 <a:ext uri="{91240B29-F687-4f45-9708-019B960494DF}">
-                  <a14:hiddenLine xmlns="" xmlns:a14="http://schemas.microsoft.com/office/drawing/2010/main" w="9525">
+                  <a14:hiddenLine xmlns:a14="http://schemas.microsoft.com/office/drawing/2010/main" xmlns="" w="9525">
                     <a:solidFill>
                       <a:srgbClr val="000000"/>
                     </a:solidFill>
@@ -10517,7 +10541,7 @@
               </a:ln>
               <a:extLst>
                 <a:ext uri="{91240B29-F687-4f45-9708-019B960494DF}">
-                  <a14:hiddenLine xmlns="" xmlns:a14="http://schemas.microsoft.com/office/drawing/2010/main" w="9525">
+                  <a14:hiddenLine xmlns:a14="http://schemas.microsoft.com/office/drawing/2010/main" xmlns="" w="9525">
                     <a:solidFill>
                       <a:srgbClr val="000000"/>
                     </a:solidFill>
@@ -10607,7 +10631,7 @@
               </a:ln>
               <a:extLst>
                 <a:ext uri="{91240B29-F687-4f45-9708-019B960494DF}">
-                  <a14:hiddenLine xmlns="" xmlns:a14="http://schemas.microsoft.com/office/drawing/2010/main" w="9525">
+                  <a14:hiddenLine xmlns:a14="http://schemas.microsoft.com/office/drawing/2010/main" xmlns="" w="9525">
                     <a:solidFill>
                       <a:srgbClr val="000000"/>
                     </a:solidFill>
@@ -10641,7 +10665,7 @@
               </a:ln>
               <a:extLst>
                 <a:ext uri="{91240B29-F687-4f45-9708-019B960494DF}">
-                  <a14:hiddenLine xmlns="" xmlns:a14="http://schemas.microsoft.com/office/drawing/2010/main" w="9525">
+                  <a14:hiddenLine xmlns:a14="http://schemas.microsoft.com/office/drawing/2010/main" xmlns="" w="9525">
                     <a:solidFill>
                       <a:srgbClr val="000000"/>
                     </a:solidFill>
@@ -10706,7 +10730,7 @@
               </a:ln>
               <a:extLst>
                 <a:ext uri="{91240B29-F687-4f45-9708-019B960494DF}">
-                  <a14:hiddenLine xmlns="" xmlns:a14="http://schemas.microsoft.com/office/drawing/2010/main" w="9525">
+                  <a14:hiddenLine xmlns:a14="http://schemas.microsoft.com/office/drawing/2010/main" xmlns="" w="9525">
                     <a:solidFill>
                       <a:srgbClr val="000000"/>
                     </a:solidFill>
@@ -10796,7 +10820,7 @@
               </a:ln>
               <a:extLst>
                 <a:ext uri="{91240B29-F687-4f45-9708-019B960494DF}">
-                  <a14:hiddenLine xmlns="" xmlns:a14="http://schemas.microsoft.com/office/drawing/2010/main" w="9525">
+                  <a14:hiddenLine xmlns:a14="http://schemas.microsoft.com/office/drawing/2010/main" xmlns="" w="9525">
                     <a:solidFill>
                       <a:srgbClr val="000000"/>
                     </a:solidFill>
@@ -10858,7 +10882,7 @@
               </a:ln>
               <a:extLst>
                 <a:ext uri="{91240B29-F687-4f45-9708-019B960494DF}">
-                  <a14:hiddenLine xmlns="" xmlns:a14="http://schemas.microsoft.com/office/drawing/2010/main" w="9525">
+                  <a14:hiddenLine xmlns:a14="http://schemas.microsoft.com/office/drawing/2010/main" xmlns="" w="9525">
                     <a:solidFill>
                       <a:srgbClr val="000000"/>
                     </a:solidFill>
@@ -10948,7 +10972,7 @@
               </a:ln>
               <a:extLst>
                 <a:ext uri="{91240B29-F687-4f45-9708-019B960494DF}">
-                  <a14:hiddenLine xmlns="" xmlns:a14="http://schemas.microsoft.com/office/drawing/2010/main" w="9525">
+                  <a14:hiddenLine xmlns:a14="http://schemas.microsoft.com/office/drawing/2010/main" xmlns="" w="9525">
                     <a:solidFill>
                       <a:srgbClr val="000000"/>
                     </a:solidFill>
@@ -11013,7 +11037,7 @@
               </a:ln>
               <a:extLst>
                 <a:ext uri="{91240B29-F687-4f45-9708-019B960494DF}">
-                  <a14:hiddenLine xmlns="" xmlns:a14="http://schemas.microsoft.com/office/drawing/2010/main" w="9525">
+                  <a14:hiddenLine xmlns:a14="http://schemas.microsoft.com/office/drawing/2010/main" xmlns="" w="9525">
                     <a:solidFill>
                       <a:srgbClr val="000000"/>
                     </a:solidFill>
@@ -11075,7 +11099,7 @@
               </a:ln>
               <a:extLst>
                 <a:ext uri="{91240B29-F687-4f45-9708-019B960494DF}">
-                  <a14:hiddenLine xmlns="" xmlns:a14="http://schemas.microsoft.com/office/drawing/2010/main" w="9525">
+                  <a14:hiddenLine xmlns:a14="http://schemas.microsoft.com/office/drawing/2010/main" xmlns="" w="9525">
                     <a:solidFill>
                       <a:srgbClr val="000000"/>
                     </a:solidFill>
@@ -11165,7 +11189,7 @@
               </a:ln>
               <a:extLst>
                 <a:ext uri="{91240B29-F687-4f45-9708-019B960494DF}">
-                  <a14:hiddenLine xmlns="" xmlns:a14="http://schemas.microsoft.com/office/drawing/2010/main" w="9525">
+                  <a14:hiddenLine xmlns:a14="http://schemas.microsoft.com/office/drawing/2010/main" xmlns="" w="9525">
                     <a:solidFill>
                       <a:srgbClr val="000000"/>
                     </a:solidFill>
@@ -11255,7 +11279,7 @@
               </a:ln>
               <a:extLst>
                 <a:ext uri="{91240B29-F687-4f45-9708-019B960494DF}">
-                  <a14:hiddenLine xmlns="" xmlns:a14="http://schemas.microsoft.com/office/drawing/2010/main" w="9525">
+                  <a14:hiddenLine xmlns:a14="http://schemas.microsoft.com/office/drawing/2010/main" xmlns="" w="9525">
                     <a:solidFill>
                       <a:srgbClr val="000000"/>
                     </a:solidFill>
@@ -11320,7 +11344,7 @@
               </a:ln>
               <a:extLst>
                 <a:ext uri="{91240B29-F687-4f45-9708-019B960494DF}">
-                  <a14:hiddenLine xmlns="" xmlns:a14="http://schemas.microsoft.com/office/drawing/2010/main" w="9525">
+                  <a14:hiddenLine xmlns:a14="http://schemas.microsoft.com/office/drawing/2010/main" xmlns="" w="9525">
                     <a:solidFill>
                       <a:srgbClr val="000000"/>
                     </a:solidFill>
@@ -11440,7 +11464,7 @@
               </a:ln>
               <a:extLst>
                 <a:ext uri="{91240B29-F687-4f45-9708-019B960494DF}">
-                  <a14:hiddenLine xmlns="" xmlns:a14="http://schemas.microsoft.com/office/drawing/2010/main" w="9525">
+                  <a14:hiddenLine xmlns:a14="http://schemas.microsoft.com/office/drawing/2010/main" xmlns="" w="9525">
                     <a:solidFill>
                       <a:srgbClr val="000000"/>
                     </a:solidFill>
@@ -11521,7 +11545,7 @@
               </a:ln>
               <a:extLst>
                 <a:ext uri="{91240B29-F687-4f45-9708-019B960494DF}">
-                  <a14:hiddenLine xmlns="" xmlns:a14="http://schemas.microsoft.com/office/drawing/2010/main" w="9525">
+                  <a14:hiddenLine xmlns:a14="http://schemas.microsoft.com/office/drawing/2010/main" xmlns="" w="9525">
                     <a:solidFill>
                       <a:srgbClr val="000000"/>
                     </a:solidFill>
@@ -11636,7 +11660,7 @@
               </a:ln>
               <a:extLst>
                 <a:ext uri="{91240B29-F687-4f45-9708-019B960494DF}">
-                  <a14:hiddenLine xmlns="" xmlns:a14="http://schemas.microsoft.com/office/drawing/2010/main" w="9525">
+                  <a14:hiddenLine xmlns:a14="http://schemas.microsoft.com/office/drawing/2010/main" xmlns="" w="9525">
                     <a:solidFill>
                       <a:srgbClr val="000000"/>
                     </a:solidFill>
@@ -11726,7 +11750,7 @@
               </a:ln>
               <a:extLst>
                 <a:ext uri="{91240B29-F687-4f45-9708-019B960494DF}">
-                  <a14:hiddenLine xmlns="" xmlns:a14="http://schemas.microsoft.com/office/drawing/2010/main" w="9525">
+                  <a14:hiddenLine xmlns:a14="http://schemas.microsoft.com/office/drawing/2010/main" xmlns="" w="9525">
                     <a:solidFill>
                       <a:srgbClr val="000000"/>
                     </a:solidFill>
@@ -11791,7 +11815,7 @@
               </a:ln>
               <a:extLst>
                 <a:ext uri="{91240B29-F687-4f45-9708-019B960494DF}">
-                  <a14:hiddenLine xmlns="" xmlns:a14="http://schemas.microsoft.com/office/drawing/2010/main" w="9525">
+                  <a14:hiddenLine xmlns:a14="http://schemas.microsoft.com/office/drawing/2010/main" xmlns="" w="9525">
                     <a:solidFill>
                       <a:srgbClr val="000000"/>
                     </a:solidFill>
@@ -11881,7 +11905,7 @@
               </a:ln>
               <a:extLst>
                 <a:ext uri="{91240B29-F687-4f45-9708-019B960494DF}">
-                  <a14:hiddenLine xmlns="" xmlns:a14="http://schemas.microsoft.com/office/drawing/2010/main" w="9525">
+                  <a14:hiddenLine xmlns:a14="http://schemas.microsoft.com/office/drawing/2010/main" xmlns="" w="9525">
                     <a:solidFill>
                       <a:srgbClr val="000000"/>
                     </a:solidFill>
@@ -11949,7 +11973,7 @@
               </a:ln>
               <a:extLst>
                 <a:ext uri="{91240B29-F687-4f45-9708-019B960494DF}">
-                  <a14:hiddenLine xmlns="" xmlns:a14="http://schemas.microsoft.com/office/drawing/2010/main" w="9525">
+                  <a14:hiddenLine xmlns:a14="http://schemas.microsoft.com/office/drawing/2010/main" xmlns="" w="9525">
                     <a:solidFill>
                       <a:srgbClr val="000000"/>
                     </a:solidFill>
@@ -12039,7 +12063,7 @@
               </a:ln>
               <a:extLst>
                 <a:ext uri="{91240B29-F687-4f45-9708-019B960494DF}">
-                  <a14:hiddenLine xmlns="" xmlns:a14="http://schemas.microsoft.com/office/drawing/2010/main" w="9525">
+                  <a14:hiddenLine xmlns:a14="http://schemas.microsoft.com/office/drawing/2010/main" xmlns="" w="9525">
                     <a:solidFill>
                       <a:srgbClr val="000000"/>
                     </a:solidFill>
@@ -12107,7 +12131,7 @@
               </a:ln>
               <a:extLst>
                 <a:ext uri="{91240B29-F687-4f45-9708-019B960494DF}">
-                  <a14:hiddenLine xmlns="" xmlns:a14="http://schemas.microsoft.com/office/drawing/2010/main" w="9525">
+                  <a14:hiddenLine xmlns:a14="http://schemas.microsoft.com/office/drawing/2010/main" xmlns="" w="9525">
                     <a:solidFill>
                       <a:srgbClr val="000000"/>
                     </a:solidFill>
@@ -12197,7 +12221,7 @@
               </a:ln>
               <a:extLst>
                 <a:ext uri="{91240B29-F687-4f45-9708-019B960494DF}">
-                  <a14:hiddenLine xmlns="" xmlns:a14="http://schemas.microsoft.com/office/drawing/2010/main" w="9525">
+                  <a14:hiddenLine xmlns:a14="http://schemas.microsoft.com/office/drawing/2010/main" xmlns="" w="9525">
                     <a:solidFill>
                       <a:srgbClr val="000000"/>
                     </a:solidFill>
@@ -12231,7 +12255,7 @@
               </a:ln>
               <a:extLst>
                 <a:ext uri="{91240B29-F687-4f45-9708-019B960494DF}">
-                  <a14:hiddenLine xmlns="" xmlns:a14="http://schemas.microsoft.com/office/drawing/2010/main" w="9525">
+                  <a14:hiddenLine xmlns:a14="http://schemas.microsoft.com/office/drawing/2010/main" xmlns="" w="9525">
                     <a:solidFill>
                       <a:srgbClr val="000000"/>
                     </a:solidFill>
@@ -13158,7 +13182,7 @@
           <p:cNvPr id="2" name="Title 1">
             <a:extLst>
               <a:ext uri="{FF2B5EF4-FFF2-40B4-BE49-F238E27FC236}">
-                <a16:creationId xmlns:a16="http://schemas.microsoft.com/office/drawing/2014/main" id="{83948EFA-DADA-195C-C57A-5C5433010324}"/>
+                <a16:creationId xmlns:a16="http://schemas.microsoft.com/office/drawing/2014/main" id="{21E42387-FABA-98F6-5520-8997D0B3C826}"/>
               </a:ext>
             </a:extLst>
           </p:cNvPr>
@@ -13171,28 +13195,27 @@
         </p:nvSpPr>
         <p:spPr>
           <a:xfrm>
-            <a:off x="1141413" y="304800"/>
-            <a:ext cx="9905998" cy="514350"/>
+            <a:off x="1285875" y="155629"/>
+            <a:ext cx="10048875" cy="1478570"/>
           </a:xfrm>
         </p:spPr>
         <p:txBody>
           <a:bodyPr>
-            <a:normAutofit fontScale="90000"/>
+            <a:normAutofit/>
           </a:bodyPr>
           <a:lstStyle/>
           <a:p>
-            <a:pPr algn="ctr"/>
             <a:r>
               <a:rPr lang="en-US" dirty="0"/>
-              <a:t>Best Practices for a rotation (</a:t>
+              <a:t>Launch requirements to assist in pager rotation duties (per </a:t>
             </a:r>
             <a:r>
               <a:rPr lang="en-US" dirty="0" err="1"/>
-              <a:t>jain</a:t>
+              <a:t>kim</a:t>
             </a:r>
             <a:r>
               <a:rPr lang="en-US" dirty="0"/>
-              <a:t>, 2024)</a:t>
+              <a:t>, et al. 2015)</a:t>
             </a:r>
           </a:p>
         </p:txBody>
@@ -13202,7 +13225,7 @@
           <p:cNvPr id="3" name="Content Placeholder 2">
             <a:extLst>
               <a:ext uri="{FF2B5EF4-FFF2-40B4-BE49-F238E27FC236}">
-                <a16:creationId xmlns:a16="http://schemas.microsoft.com/office/drawing/2014/main" id="{B02BF6D4-5B49-A4DE-BE34-BB06B79AE585}"/>
+                <a16:creationId xmlns:a16="http://schemas.microsoft.com/office/drawing/2014/main" id="{12AB2E0E-D673-A940-5EDA-64AFA06060F3}"/>
               </a:ext>
             </a:extLst>
           </p:cNvPr>
@@ -13215,54 +13238,65 @@
         </p:nvSpPr>
         <p:spPr>
           <a:xfrm>
-            <a:off x="1141413" y="819151"/>
-            <a:ext cx="9905999" cy="5943600"/>
+            <a:off x="1800225" y="1634198"/>
+            <a:ext cx="8524876" cy="4880901"/>
           </a:xfrm>
         </p:spPr>
         <p:txBody>
           <a:bodyPr>
-            <a:normAutofit lnSpcReduction="10000"/>
+            <a:normAutofit/>
           </a:bodyPr>
           <a:lstStyle/>
           <a:p>
             <a:r>
               <a:rPr lang="en-US" dirty="0"/>
-              <a:t>Apply a “follow-the-sun” strategy where SREs are geographically located to be working during the day while supporting a service.  Support teams may need a rotation around the globe to provide 24hr coverage while providing the best support</a:t>
-            </a:r>
-          </a:p>
-          <a:p>
+              <a:t>Track defect counts and severity</a:t>
+            </a:r>
+          </a:p>
+          <a:p>
+            <a:r>
+              <a:rPr lang="en-US" sz="2400" dirty="0"/>
+              <a:t>Anal</a:t>
+            </a:r>
             <a:r>
               <a:rPr lang="en-US" dirty="0"/>
-              <a:t>If global rotation isn’t possible, rotation for nocturnal work should be shared and rotated on a quarterly / monthly basis. </a:t>
+              <a:t>yze the type/frequency of pager alerts to detect trends</a:t>
             </a:r>
           </a:p>
           <a:p>
             <a:r>
               <a:rPr lang="en-US" dirty="0"/>
-              <a:t>Manage PTO and vacation time with different teams to cover regional holidays or someone’s well-deserved time away from work. </a:t>
-            </a:r>
-          </a:p>
-          <a:p>
+              <a:t>Monitor coverage to prove issue resolution is sufficient for service</a:t>
+            </a:r>
+          </a:p>
+          <a:p>
+            <a:r>
+              <a:rPr lang="en-US" sz="2400" dirty="0"/>
+              <a:t>Is th</a:t>
+            </a:r>
             <a:r>
               <a:rPr lang="en-US" dirty="0"/>
-              <a:t>Modify the composition of shift changes so any outstanding issues are properly documented and handed off to prevent further delays in service for a customer.</a:t>
-            </a:r>
-          </a:p>
-          <a:p>
-            <a:r>
-              <a:rPr lang="en-US" dirty="0"/>
-              <a:t>Alerts should be utilized to proactively react when a service starts to falter so that a quick turn around time can occur for a solution.</a:t>
-            </a:r>
-          </a:p>
-          <a:p>
-            <a:endParaRPr lang="en-US" dirty="0"/>
+              <a:t>e system architecture built to handle changes that my occur during deployment</a:t>
+            </a:r>
+          </a:p>
+          <a:p>
+            <a:r>
+              <a:rPr lang="en-US" sz="2400" dirty="0"/>
+              <a:t>Is the deployment process automated to be predictable and sufficient to use during production</a:t>
+            </a:r>
+          </a:p>
+          <a:p>
+            <a:r>
+              <a:rPr lang="en-US" sz="2400" dirty="0"/>
+              <a:t>Does evidence support that the developers have followed standards that others could manage reliability issues</a:t>
+            </a:r>
           </a:p>
         </p:txBody>
       </p:sp>
     </p:spTree>
     <p:extLst>
       <p:ext uri="{BB962C8B-B14F-4D97-AF65-F5344CB8AC3E}">
-        <p14:creationId xmlns:p14="http://schemas.microsoft.com/office/powerpoint/2010/main" val="362107881"/>
+        <p14:creationId xmlns:p14="http://schemas.microsoft.com/office/powerpoint/2010/main" val="2370549098"/>
       </p:ext>
     </p:extLst>
   </p:cSld>
@@ -13328,7 +13362,7 @@
             </a:r>
             <a:r>
               <a:rPr lang="en-US" dirty="0"/>
-              <a:t>, 2024) cont.</a:t>
+              <a:t>, 2024)</a:t>
             </a:r>
           </a:p>
         </p:txBody>
@@ -13357,41 +13391,38 @@
         </p:spPr>
         <p:txBody>
           <a:bodyPr>
-            <a:normAutofit/>
+            <a:normAutofit lnSpcReduction="10000"/>
           </a:bodyPr>
           <a:lstStyle/>
           <a:p>
             <a:r>
               <a:rPr lang="en-US" dirty="0"/>
-              <a:t>Troubleshooting larger issues should include more SREs with various backgrounds to put the issues to rest.</a:t>
+              <a:t>Apply a “follow-the-sun” strategy where SREs are geographically located to be working during the day while supporting a service.  Support teams may need a rotation around the globe to provide 24hr coverage while providing the best support</a:t>
             </a:r>
           </a:p>
           <a:p>
             <a:r>
               <a:rPr lang="en-US" dirty="0"/>
-              <a:t>Implementation of service during deployment should be monitored and tickets should be issued to catalogue items for further review. </a:t>
+              <a:t>If global rotation isn’t possible, rotation for nocturnal work should be shared and rotated on a quarterly / monthly basis. </a:t>
             </a:r>
           </a:p>
           <a:p>
             <a:r>
               <a:rPr lang="en-US" dirty="0"/>
-              <a:t>Encourage taking risks so that support understands that it is more important to try a solution than to fear the possibility that the solution will not work. </a:t>
+              <a:t>Manage PTO and vacation time with different teams to cover regional holidays or someone’s well-deserved time away from work. </a:t>
             </a:r>
           </a:p>
           <a:p>
             <a:r>
               <a:rPr lang="en-US" dirty="0"/>
-              <a:t>Perform postmortem investigations after an issue has been resolved to find out why it occurred and how it can be prevented elsewhere. </a:t>
+              <a:t>Modify the composition of shift changes so any outstanding issues are properly documented and handed off to prevent further delays in service for a customer.</a:t>
             </a:r>
           </a:p>
           <a:p>
             <a:r>
               <a:rPr lang="en-US" dirty="0"/>
-              <a:t>Escalation protocols need to be in place so that unresolvable issues are sent up the chain of command to people with more experience and work history that may be able to provide a solution and lower downtimes.</a:t>
-            </a:r>
-          </a:p>
-          <a:p>
-            <a:endParaRPr lang="en-US" dirty="0"/>
+              <a:t>Alerts should be utilized to proactively react when a service starts to falter so that a quick turn around time can occur for a solution.</a:t>
+            </a:r>
           </a:p>
           <a:p>
             <a:endParaRPr lang="en-US" dirty="0"/>
@@ -13401,7 +13432,7 @@
     </p:spTree>
     <p:extLst>
       <p:ext uri="{BB962C8B-B14F-4D97-AF65-F5344CB8AC3E}">
-        <p14:creationId xmlns:p14="http://schemas.microsoft.com/office/powerpoint/2010/main" val="2280153111"/>
+        <p14:creationId xmlns:p14="http://schemas.microsoft.com/office/powerpoint/2010/main" val="362107881"/>
       </p:ext>
     </p:extLst>
   </p:cSld>
@@ -13467,7 +13498,7 @@
             </a:r>
             <a:r>
               <a:rPr lang="en-US" dirty="0"/>
-              <a:t>, 2024) Cont. (2)</a:t>
+              <a:t>, 2024) cont.</a:t>
             </a:r>
           </a:p>
         </p:txBody>
@@ -13502,6 +13533,145 @@
           <a:p>
             <a:r>
               <a:rPr lang="en-US" dirty="0"/>
+              <a:t>Troubleshooting larger issues should include more SREs with various backgrounds to put the issues to rest.</a:t>
+            </a:r>
+          </a:p>
+          <a:p>
+            <a:r>
+              <a:rPr lang="en-US" dirty="0"/>
+              <a:t>Implementation of service during deployment should be monitored and tickets should be issued to catalogue items for further review. </a:t>
+            </a:r>
+          </a:p>
+          <a:p>
+            <a:r>
+              <a:rPr lang="en-US" dirty="0"/>
+              <a:t>Encourage taking risks so that support understands that it is more important to try a solution than to fear the possibility that the solution will not work. </a:t>
+            </a:r>
+          </a:p>
+          <a:p>
+            <a:r>
+              <a:rPr lang="en-US" dirty="0"/>
+              <a:t>Perform postmortem investigations after an issue has been resolved to find out why it occurred and how it can be prevented elsewhere. </a:t>
+            </a:r>
+          </a:p>
+          <a:p>
+            <a:r>
+              <a:rPr lang="en-US" dirty="0"/>
+              <a:t>Escalation protocols need to be in place so that unresolvable issues are sent up the chain of command to people with more experience and work history that may be able to provide a solution and lower downtimes.</a:t>
+            </a:r>
+          </a:p>
+          <a:p>
+            <a:endParaRPr lang="en-US" dirty="0"/>
+          </a:p>
+          <a:p>
+            <a:endParaRPr lang="en-US" dirty="0"/>
+          </a:p>
+        </p:txBody>
+      </p:sp>
+    </p:spTree>
+    <p:extLst>
+      <p:ext uri="{BB962C8B-B14F-4D97-AF65-F5344CB8AC3E}">
+        <p14:creationId xmlns:p14="http://schemas.microsoft.com/office/powerpoint/2010/main" val="2280153111"/>
+      </p:ext>
+    </p:extLst>
+  </p:cSld>
+  <p:clrMapOvr>
+    <a:masterClrMapping/>
+  </p:clrMapOvr>
+</p:sld>
+</file>
+
+<file path=ppt/slides/slide7.xml><?xml version="1.0" encoding="utf-8"?>
+<p:sld xmlns:a="http://schemas.openxmlformats.org/drawingml/2006/main" xmlns:r="http://schemas.openxmlformats.org/officeDocument/2006/relationships" xmlns:p="http://schemas.openxmlformats.org/presentationml/2006/main">
+  <p:cSld>
+    <p:spTree>
+      <p:nvGrpSpPr>
+        <p:cNvPr id="1" name=""/>
+        <p:cNvGrpSpPr/>
+        <p:nvPr/>
+      </p:nvGrpSpPr>
+      <p:grpSpPr>
+        <a:xfrm>
+          <a:off x="0" y="0"/>
+          <a:ext cx="0" cy="0"/>
+          <a:chOff x="0" y="0"/>
+          <a:chExt cx="0" cy="0"/>
+        </a:xfrm>
+      </p:grpSpPr>
+      <p:sp>
+        <p:nvSpPr>
+          <p:cNvPr id="2" name="Title 1">
+            <a:extLst>
+              <a:ext uri="{FF2B5EF4-FFF2-40B4-BE49-F238E27FC236}">
+                <a16:creationId xmlns:a16="http://schemas.microsoft.com/office/drawing/2014/main" id="{83948EFA-DADA-195C-C57A-5C5433010324}"/>
+              </a:ext>
+            </a:extLst>
+          </p:cNvPr>
+          <p:cNvSpPr>
+            <a:spLocks noGrp="1"/>
+          </p:cNvSpPr>
+          <p:nvPr>
+            <p:ph type="title"/>
+          </p:nvPr>
+        </p:nvSpPr>
+        <p:spPr>
+          <a:xfrm>
+            <a:off x="1141413" y="304800"/>
+            <a:ext cx="9905998" cy="514350"/>
+          </a:xfrm>
+        </p:spPr>
+        <p:txBody>
+          <a:bodyPr>
+            <a:normAutofit fontScale="90000"/>
+          </a:bodyPr>
+          <a:lstStyle/>
+          <a:p>
+            <a:pPr algn="ctr"/>
+            <a:r>
+              <a:rPr lang="en-US" dirty="0"/>
+              <a:t>Best Practices for a rotation (</a:t>
+            </a:r>
+            <a:r>
+              <a:rPr lang="en-US" dirty="0" err="1"/>
+              <a:t>jain</a:t>
+            </a:r>
+            <a:r>
+              <a:rPr lang="en-US" dirty="0"/>
+              <a:t>, 2024) Cont. (2)</a:t>
+            </a:r>
+          </a:p>
+        </p:txBody>
+      </p:sp>
+      <p:sp>
+        <p:nvSpPr>
+          <p:cNvPr id="3" name="Content Placeholder 2">
+            <a:extLst>
+              <a:ext uri="{FF2B5EF4-FFF2-40B4-BE49-F238E27FC236}">
+                <a16:creationId xmlns:a16="http://schemas.microsoft.com/office/drawing/2014/main" id="{B02BF6D4-5B49-A4DE-BE34-BB06B79AE585}"/>
+              </a:ext>
+            </a:extLst>
+          </p:cNvPr>
+          <p:cNvSpPr>
+            <a:spLocks noGrp="1"/>
+          </p:cNvSpPr>
+          <p:nvPr>
+            <p:ph idx="1"/>
+          </p:nvPr>
+        </p:nvSpPr>
+        <p:spPr>
+          <a:xfrm>
+            <a:off x="1141413" y="819151"/>
+            <a:ext cx="9905999" cy="5943600"/>
+          </a:xfrm>
+        </p:spPr>
+        <p:txBody>
+          <a:bodyPr>
+            <a:normAutofit/>
+          </a:bodyPr>
+          <a:lstStyle/>
+          <a:p>
+            <a:r>
+              <a:rPr lang="en-US" dirty="0"/>
               <a:t>Enhance the page load by providing key information so that the right group is contacted to handle the specific type of issue. </a:t>
             </a:r>
           </a:p>
@@ -13550,7 +13720,7 @@
 </p:sld>
 </file>
 
-<file path=ppt/slides/slide7.xml><?xml version="1.0" encoding="utf-8"?>
+<file path=ppt/slides/slide8.xml><?xml version="1.0" encoding="utf-8"?>
 <p:sld xmlns:a="http://schemas.openxmlformats.org/drawingml/2006/main" xmlns:r="http://schemas.openxmlformats.org/officeDocument/2006/relationships" xmlns:p="http://schemas.openxmlformats.org/presentationml/2006/main">
   <p:cSld>
     <p:spTree>
@@ -13650,7 +13820,7 @@
 </p:sld>
 </file>
 
-<file path=ppt/slides/slide8.xml><?xml version="1.0" encoding="utf-8"?>
+<file path=ppt/slides/slide9.xml><?xml version="1.0" encoding="utf-8"?>
 <p:sld xmlns:a="http://schemas.openxmlformats.org/drawingml/2006/main" xmlns:r="http://schemas.openxmlformats.org/officeDocument/2006/relationships" xmlns:p="http://schemas.openxmlformats.org/presentationml/2006/main">
   <p:cSld>
     <p:spTree>

</xml_diff>